<commit_message>
sandbox: update the pptx
Signed-off-by: Jianxiong Cai <caijx@shanghaitech.edu.cn>
</commit_message>
<xml_diff>
--- a/OSII safe-box.pptx
+++ b/OSII safe-box.pptx
@@ -4,6 +4,9 @@
   <p:sldMasterIdLst>
     <p:sldMasterId id="2147483758" r:id="rId1"/>
   </p:sldMasterIdLst>
+  <p:notesMasterIdLst>
+    <p:notesMasterId r:id="rId8"/>
+  </p:notesMasterIdLst>
   <p:sldIdLst>
     <p:sldId id="256" r:id="rId2"/>
     <p:sldId id="257" r:id="rId3"/>
@@ -109,11 +112,673 @@
       </a:defRPr>
     </a:lvl9pPr>
   </p:defaultTextStyle>
+  <p:extLst>
+    <p:ext uri="{EFAFB233-063F-42B5-8137-9DF3F51BA10A}">
+      <p15:sldGuideLst xmlns:p15="http://schemas.microsoft.com/office/powerpoint/2012/main"/>
+    </p:ext>
+  </p:extLst>
 </p:presentation>
 </file>
 
 <file path=ppt/revisionInfo.xml><?xml version="1.0" encoding="utf-8"?>
 <p1510:revInfo xmlns:a="http://schemas.openxmlformats.org/drawingml/2006/main" xmlns:r="http://schemas.openxmlformats.org/officeDocument/2006/relationships" xmlns:p1510="http://schemas.microsoft.com/office/powerpoint/2015/10/main"/>
+</file>
+
+<file path=ppt/notesMasters/notesMaster1.xml><?xml version="1.0" encoding="utf-8"?>
+<p:notesMaster xmlns:a="http://schemas.openxmlformats.org/drawingml/2006/main" xmlns:r="http://schemas.openxmlformats.org/officeDocument/2006/relationships" xmlns:p="http://schemas.openxmlformats.org/presentationml/2006/main">
+  <p:cSld>
+    <p:bg>
+      <p:bgRef idx="1001">
+        <a:schemeClr val="bg1"/>
+      </p:bgRef>
+    </p:bg>
+    <p:spTree>
+      <p:nvGrpSpPr>
+        <p:cNvPr id="1" name=""/>
+        <p:cNvGrpSpPr/>
+        <p:nvPr/>
+      </p:nvGrpSpPr>
+      <p:grpSpPr>
+        <a:xfrm>
+          <a:off x="0" y="0"/>
+          <a:ext cx="0" cy="0"/>
+          <a:chOff x="0" y="0"/>
+          <a:chExt cx="0" cy="0"/>
+        </a:xfrm>
+      </p:grpSpPr>
+      <p:sp>
+        <p:nvSpPr>
+          <p:cNvPr id="2" name="Header Placeholder 1"/>
+          <p:cNvSpPr>
+            <a:spLocks noGrp="1"/>
+          </p:cNvSpPr>
+          <p:nvPr>
+            <p:ph type="hdr" sz="quarter"/>
+          </p:nvPr>
+        </p:nvSpPr>
+        <p:spPr>
+          <a:xfrm>
+            <a:off x="0" y="0"/>
+            <a:ext cx="2971800" cy="458788"/>
+          </a:xfrm>
+          <a:prstGeom prst="rect">
+            <a:avLst/>
+          </a:prstGeom>
+        </p:spPr>
+        <p:txBody>
+          <a:bodyPr vert="horz" lIns="91440" tIns="45720" rIns="91440" bIns="45720" rtlCol="0"/>
+          <a:lstStyle>
+            <a:lvl1pPr algn="l">
+              <a:defRPr sz="1200"/>
+            </a:lvl1pPr>
+          </a:lstStyle>
+          <a:p>
+            <a:endParaRPr lang="en-US"/>
+          </a:p>
+        </p:txBody>
+      </p:sp>
+      <p:sp>
+        <p:nvSpPr>
+          <p:cNvPr id="3" name="Date Placeholder 2"/>
+          <p:cNvSpPr>
+            <a:spLocks noGrp="1"/>
+          </p:cNvSpPr>
+          <p:nvPr>
+            <p:ph type="dt" idx="1"/>
+          </p:nvPr>
+        </p:nvSpPr>
+        <p:spPr>
+          <a:xfrm>
+            <a:off x="3884613" y="0"/>
+            <a:ext cx="2971800" cy="458788"/>
+          </a:xfrm>
+          <a:prstGeom prst="rect">
+            <a:avLst/>
+          </a:prstGeom>
+        </p:spPr>
+        <p:txBody>
+          <a:bodyPr vert="horz" lIns="91440" tIns="45720" rIns="91440" bIns="45720" rtlCol="0"/>
+          <a:lstStyle>
+            <a:lvl1pPr algn="r">
+              <a:defRPr sz="1200"/>
+            </a:lvl1pPr>
+          </a:lstStyle>
+          <a:p>
+            <a:fld id="{3F053011-E80B-9747-AB37-0207D3D3E80B}" type="datetimeFigureOut">
+              <a:rPr lang="en-US" smtClean="0"/>
+              <a:t>5/30/17</a:t>
+            </a:fld>
+            <a:endParaRPr lang="en-US"/>
+          </a:p>
+        </p:txBody>
+      </p:sp>
+      <p:sp>
+        <p:nvSpPr>
+          <p:cNvPr id="4" name="Slide Image Placeholder 3"/>
+          <p:cNvSpPr>
+            <a:spLocks noGrp="1" noRot="1" noChangeAspect="1"/>
+          </p:cNvSpPr>
+          <p:nvPr>
+            <p:ph type="sldImg" idx="2"/>
+          </p:nvPr>
+        </p:nvSpPr>
+        <p:spPr>
+          <a:xfrm>
+            <a:off x="685800" y="1143000"/>
+            <a:ext cx="5486400" cy="3086100"/>
+          </a:xfrm>
+          <a:prstGeom prst="rect">
+            <a:avLst/>
+          </a:prstGeom>
+          <a:noFill/>
+          <a:ln w="12700">
+            <a:solidFill>
+              <a:prstClr val="black"/>
+            </a:solidFill>
+          </a:ln>
+        </p:spPr>
+        <p:txBody>
+          <a:bodyPr vert="horz" lIns="91440" tIns="45720" rIns="91440" bIns="45720" rtlCol="0" anchor="ctr"/>
+          <a:lstStyle/>
+          <a:p>
+            <a:endParaRPr lang="en-US"/>
+          </a:p>
+        </p:txBody>
+      </p:sp>
+      <p:sp>
+        <p:nvSpPr>
+          <p:cNvPr id="5" name="Notes Placeholder 4"/>
+          <p:cNvSpPr>
+            <a:spLocks noGrp="1"/>
+          </p:cNvSpPr>
+          <p:nvPr>
+            <p:ph type="body" sz="quarter" idx="3"/>
+          </p:nvPr>
+        </p:nvSpPr>
+        <p:spPr>
+          <a:xfrm>
+            <a:off x="685800" y="4400550"/>
+            <a:ext cx="5486400" cy="3600450"/>
+          </a:xfrm>
+          <a:prstGeom prst="rect">
+            <a:avLst/>
+          </a:prstGeom>
+        </p:spPr>
+        <p:txBody>
+          <a:bodyPr vert="horz" lIns="91440" tIns="45720" rIns="91440" bIns="45720" rtlCol="0"/>
+          <a:lstStyle/>
+          <a:p>
+            <a:pPr lvl="0"/>
+            <a:r>
+              <a:rPr lang="en-US" smtClean="0"/>
+              <a:t>Click to edit Master text styles</a:t>
+            </a:r>
+          </a:p>
+          <a:p>
+            <a:pPr lvl="1"/>
+            <a:r>
+              <a:rPr lang="en-US" smtClean="0"/>
+              <a:t>Second level</a:t>
+            </a:r>
+          </a:p>
+          <a:p>
+            <a:pPr lvl="2"/>
+            <a:r>
+              <a:rPr lang="en-US" smtClean="0"/>
+              <a:t>Third level</a:t>
+            </a:r>
+          </a:p>
+          <a:p>
+            <a:pPr lvl="3"/>
+            <a:r>
+              <a:rPr lang="en-US" smtClean="0"/>
+              <a:t>Fourth level</a:t>
+            </a:r>
+          </a:p>
+          <a:p>
+            <a:pPr lvl="4"/>
+            <a:r>
+              <a:rPr lang="en-US" smtClean="0"/>
+              <a:t>Fifth level</a:t>
+            </a:r>
+            <a:endParaRPr lang="en-US"/>
+          </a:p>
+        </p:txBody>
+      </p:sp>
+      <p:sp>
+        <p:nvSpPr>
+          <p:cNvPr id="6" name="Footer Placeholder 5"/>
+          <p:cNvSpPr>
+            <a:spLocks noGrp="1"/>
+          </p:cNvSpPr>
+          <p:nvPr>
+            <p:ph type="ftr" sz="quarter" idx="4"/>
+          </p:nvPr>
+        </p:nvSpPr>
+        <p:spPr>
+          <a:xfrm>
+            <a:off x="0" y="8685213"/>
+            <a:ext cx="2971800" cy="458787"/>
+          </a:xfrm>
+          <a:prstGeom prst="rect">
+            <a:avLst/>
+          </a:prstGeom>
+        </p:spPr>
+        <p:txBody>
+          <a:bodyPr vert="horz" lIns="91440" tIns="45720" rIns="91440" bIns="45720" rtlCol="0" anchor="b"/>
+          <a:lstStyle>
+            <a:lvl1pPr algn="l">
+              <a:defRPr sz="1200"/>
+            </a:lvl1pPr>
+          </a:lstStyle>
+          <a:p>
+            <a:endParaRPr lang="en-US"/>
+          </a:p>
+        </p:txBody>
+      </p:sp>
+      <p:sp>
+        <p:nvSpPr>
+          <p:cNvPr id="7" name="Slide Number Placeholder 6"/>
+          <p:cNvSpPr>
+            <a:spLocks noGrp="1"/>
+          </p:cNvSpPr>
+          <p:nvPr>
+            <p:ph type="sldNum" sz="quarter" idx="5"/>
+          </p:nvPr>
+        </p:nvSpPr>
+        <p:spPr>
+          <a:xfrm>
+            <a:off x="3884613" y="8685213"/>
+            <a:ext cx="2971800" cy="458787"/>
+          </a:xfrm>
+          <a:prstGeom prst="rect">
+            <a:avLst/>
+          </a:prstGeom>
+        </p:spPr>
+        <p:txBody>
+          <a:bodyPr vert="horz" lIns="91440" tIns="45720" rIns="91440" bIns="45720" rtlCol="0" anchor="b"/>
+          <a:lstStyle>
+            <a:lvl1pPr algn="r">
+              <a:defRPr sz="1200"/>
+            </a:lvl1pPr>
+          </a:lstStyle>
+          <a:p>
+            <a:fld id="{F375C37C-2F89-1044-AB8A-95317A63F08B}" type="slidenum">
+              <a:rPr lang="en-US" smtClean="0"/>
+              <a:t>‹#›</a:t>
+            </a:fld>
+            <a:endParaRPr lang="en-US"/>
+          </a:p>
+        </p:txBody>
+      </p:sp>
+    </p:spTree>
+    <p:extLst>
+      <p:ext uri="{BB962C8B-B14F-4D97-AF65-F5344CB8AC3E}">
+        <p14:creationId xmlns:p14="http://schemas.microsoft.com/office/powerpoint/2010/main" val="108410021"/>
+      </p:ext>
+    </p:extLst>
+  </p:cSld>
+  <p:clrMap bg1="lt1" tx1="dk1" bg2="lt2" tx2="dk2" accent1="accent1" accent2="accent2" accent3="accent3" accent4="accent4" accent5="accent5" accent6="accent6" hlink="hlink" folHlink="folHlink"/>
+  <p:notesStyle>
+    <a:lvl1pPr marL="0" algn="l" defTabSz="914400" rtl="0" eaLnBrk="1" latinLnBrk="0" hangingPunct="1">
+      <a:defRPr sz="1200" kern="1200">
+        <a:solidFill>
+          <a:schemeClr val="tx1"/>
+        </a:solidFill>
+        <a:latin typeface="+mn-lt"/>
+        <a:ea typeface="+mn-ea"/>
+        <a:cs typeface="+mn-cs"/>
+      </a:defRPr>
+    </a:lvl1pPr>
+    <a:lvl2pPr marL="457200" algn="l" defTabSz="914400" rtl="0" eaLnBrk="1" latinLnBrk="0" hangingPunct="1">
+      <a:defRPr sz="1200" kern="1200">
+        <a:solidFill>
+          <a:schemeClr val="tx1"/>
+        </a:solidFill>
+        <a:latin typeface="+mn-lt"/>
+        <a:ea typeface="+mn-ea"/>
+        <a:cs typeface="+mn-cs"/>
+      </a:defRPr>
+    </a:lvl2pPr>
+    <a:lvl3pPr marL="914400" algn="l" defTabSz="914400" rtl="0" eaLnBrk="1" latinLnBrk="0" hangingPunct="1">
+      <a:defRPr sz="1200" kern="1200">
+        <a:solidFill>
+          <a:schemeClr val="tx1"/>
+        </a:solidFill>
+        <a:latin typeface="+mn-lt"/>
+        <a:ea typeface="+mn-ea"/>
+        <a:cs typeface="+mn-cs"/>
+      </a:defRPr>
+    </a:lvl3pPr>
+    <a:lvl4pPr marL="1371600" algn="l" defTabSz="914400" rtl="0" eaLnBrk="1" latinLnBrk="0" hangingPunct="1">
+      <a:defRPr sz="1200" kern="1200">
+        <a:solidFill>
+          <a:schemeClr val="tx1"/>
+        </a:solidFill>
+        <a:latin typeface="+mn-lt"/>
+        <a:ea typeface="+mn-ea"/>
+        <a:cs typeface="+mn-cs"/>
+      </a:defRPr>
+    </a:lvl4pPr>
+    <a:lvl5pPr marL="1828800" algn="l" defTabSz="914400" rtl="0" eaLnBrk="1" latinLnBrk="0" hangingPunct="1">
+      <a:defRPr sz="1200" kern="1200">
+        <a:solidFill>
+          <a:schemeClr val="tx1"/>
+        </a:solidFill>
+        <a:latin typeface="+mn-lt"/>
+        <a:ea typeface="+mn-ea"/>
+        <a:cs typeface="+mn-cs"/>
+      </a:defRPr>
+    </a:lvl5pPr>
+    <a:lvl6pPr marL="2286000" algn="l" defTabSz="914400" rtl="0" eaLnBrk="1" latinLnBrk="0" hangingPunct="1">
+      <a:defRPr sz="1200" kern="1200">
+        <a:solidFill>
+          <a:schemeClr val="tx1"/>
+        </a:solidFill>
+        <a:latin typeface="+mn-lt"/>
+        <a:ea typeface="+mn-ea"/>
+        <a:cs typeface="+mn-cs"/>
+      </a:defRPr>
+    </a:lvl6pPr>
+    <a:lvl7pPr marL="2743200" algn="l" defTabSz="914400" rtl="0" eaLnBrk="1" latinLnBrk="0" hangingPunct="1">
+      <a:defRPr sz="1200" kern="1200">
+        <a:solidFill>
+          <a:schemeClr val="tx1"/>
+        </a:solidFill>
+        <a:latin typeface="+mn-lt"/>
+        <a:ea typeface="+mn-ea"/>
+        <a:cs typeface="+mn-cs"/>
+      </a:defRPr>
+    </a:lvl7pPr>
+    <a:lvl8pPr marL="3200400" algn="l" defTabSz="914400" rtl="0" eaLnBrk="1" latinLnBrk="0" hangingPunct="1">
+      <a:defRPr sz="1200" kern="1200">
+        <a:solidFill>
+          <a:schemeClr val="tx1"/>
+        </a:solidFill>
+        <a:latin typeface="+mn-lt"/>
+        <a:ea typeface="+mn-ea"/>
+        <a:cs typeface="+mn-cs"/>
+      </a:defRPr>
+    </a:lvl8pPr>
+    <a:lvl9pPr marL="3657600" algn="l" defTabSz="914400" rtl="0" eaLnBrk="1" latinLnBrk="0" hangingPunct="1">
+      <a:defRPr sz="1200" kern="1200">
+        <a:solidFill>
+          <a:schemeClr val="tx1"/>
+        </a:solidFill>
+        <a:latin typeface="+mn-lt"/>
+        <a:ea typeface="+mn-ea"/>
+        <a:cs typeface="+mn-cs"/>
+      </a:defRPr>
+    </a:lvl9pPr>
+  </p:notesStyle>
+</p:notesMaster>
+</file>
+
+<file path=ppt/notesSlides/notesSlide1.xml><?xml version="1.0" encoding="utf-8"?>
+<p:notes xmlns:a="http://schemas.openxmlformats.org/drawingml/2006/main" xmlns:r="http://schemas.openxmlformats.org/officeDocument/2006/relationships" xmlns:p="http://schemas.openxmlformats.org/presentationml/2006/main">
+  <p:cSld>
+    <p:spTree>
+      <p:nvGrpSpPr>
+        <p:cNvPr id="1" name=""/>
+        <p:cNvGrpSpPr/>
+        <p:nvPr/>
+      </p:nvGrpSpPr>
+      <p:grpSpPr>
+        <a:xfrm>
+          <a:off x="0" y="0"/>
+          <a:ext cx="0" cy="0"/>
+          <a:chOff x="0" y="0"/>
+          <a:chExt cx="0" cy="0"/>
+        </a:xfrm>
+      </p:grpSpPr>
+      <p:sp>
+        <p:nvSpPr>
+          <p:cNvPr id="2" name="Slide Image Placeholder 1"/>
+          <p:cNvSpPr>
+            <a:spLocks noGrp="1" noRot="1" noChangeAspect="1"/>
+          </p:cNvSpPr>
+          <p:nvPr>
+            <p:ph type="sldImg"/>
+          </p:nvPr>
+        </p:nvSpPr>
+        <p:spPr/>
+      </p:sp>
+      <p:sp>
+        <p:nvSpPr>
+          <p:cNvPr id="3" name="Notes Placeholder 2"/>
+          <p:cNvSpPr>
+            <a:spLocks noGrp="1"/>
+          </p:cNvSpPr>
+          <p:nvPr>
+            <p:ph type="body" idx="1"/>
+          </p:nvPr>
+        </p:nvSpPr>
+        <p:spPr/>
+        <p:txBody>
+          <a:bodyPr/>
+          <a:lstStyle/>
+          <a:p>
+            <a:endParaRPr lang="en-US" dirty="0"/>
+          </a:p>
+        </p:txBody>
+      </p:sp>
+      <p:sp>
+        <p:nvSpPr>
+          <p:cNvPr id="4" name="Slide Number Placeholder 3"/>
+          <p:cNvSpPr>
+            <a:spLocks noGrp="1"/>
+          </p:cNvSpPr>
+          <p:nvPr>
+            <p:ph type="sldNum" sz="quarter" idx="10"/>
+          </p:nvPr>
+        </p:nvSpPr>
+        <p:spPr/>
+        <p:txBody>
+          <a:bodyPr/>
+          <a:lstStyle/>
+          <a:p>
+            <a:fld id="{F375C37C-2F89-1044-AB8A-95317A63F08B}" type="slidenum">
+              <a:rPr lang="en-US" smtClean="0"/>
+              <a:t>3</a:t>
+            </a:fld>
+            <a:endParaRPr lang="en-US"/>
+          </a:p>
+        </p:txBody>
+      </p:sp>
+    </p:spTree>
+    <p:extLst>
+      <p:ext uri="{BB962C8B-B14F-4D97-AF65-F5344CB8AC3E}">
+        <p14:creationId xmlns:p14="http://schemas.microsoft.com/office/powerpoint/2010/main" val="981090291"/>
+      </p:ext>
+    </p:extLst>
+  </p:cSld>
+  <p:clrMapOvr>
+    <a:masterClrMapping/>
+  </p:clrMapOvr>
+</p:notes>
+</file>
+
+<file path=ppt/notesSlides/notesSlide2.xml><?xml version="1.0" encoding="utf-8"?>
+<p:notes xmlns:a="http://schemas.openxmlformats.org/drawingml/2006/main" xmlns:r="http://schemas.openxmlformats.org/officeDocument/2006/relationships" xmlns:p="http://schemas.openxmlformats.org/presentationml/2006/main">
+  <p:cSld>
+    <p:spTree>
+      <p:nvGrpSpPr>
+        <p:cNvPr id="1" name=""/>
+        <p:cNvGrpSpPr/>
+        <p:nvPr/>
+      </p:nvGrpSpPr>
+      <p:grpSpPr>
+        <a:xfrm>
+          <a:off x="0" y="0"/>
+          <a:ext cx="0" cy="0"/>
+          <a:chOff x="0" y="0"/>
+          <a:chExt cx="0" cy="0"/>
+        </a:xfrm>
+      </p:grpSpPr>
+      <p:sp>
+        <p:nvSpPr>
+          <p:cNvPr id="2" name="Slide Image Placeholder 1"/>
+          <p:cNvSpPr>
+            <a:spLocks noGrp="1" noRot="1" noChangeAspect="1"/>
+          </p:cNvSpPr>
+          <p:nvPr>
+            <p:ph type="sldImg"/>
+          </p:nvPr>
+        </p:nvSpPr>
+        <p:spPr/>
+      </p:sp>
+      <p:sp>
+        <p:nvSpPr>
+          <p:cNvPr id="3" name="Notes Placeholder 2"/>
+          <p:cNvSpPr>
+            <a:spLocks noGrp="1"/>
+          </p:cNvSpPr>
+          <p:nvPr>
+            <p:ph type="body" idx="1"/>
+          </p:nvPr>
+        </p:nvSpPr>
+        <p:spPr/>
+        <p:txBody>
+          <a:bodyPr/>
+          <a:lstStyle/>
+          <a:p>
+            <a:r>
+              <a:rPr lang="en-US" dirty="0" err="1" smtClean="0"/>
+              <a:t>Ptrace</a:t>
+            </a:r>
+            <a:endParaRPr lang="en-US" dirty="0" smtClean="0"/>
+          </a:p>
+          <a:p>
+            <a:r>
+              <a:rPr lang="en-US" dirty="0" smtClean="0"/>
+              <a:t>Encapsulation</a:t>
+            </a:r>
+          </a:p>
+          <a:p>
+            <a:r>
+              <a:rPr lang="en-US" dirty="0" smtClean="0"/>
+              <a:t>File</a:t>
+            </a:r>
+          </a:p>
+          <a:p>
+            <a:r>
+              <a:rPr lang="en-US" dirty="0" smtClean="0"/>
+              <a:t>	open read write</a:t>
+            </a:r>
+            <a:r>
+              <a:rPr lang="en-US" baseline="0" dirty="0" smtClean="0"/>
+              <a:t> close</a:t>
+            </a:r>
+            <a:endParaRPr lang="en-US" dirty="0"/>
+          </a:p>
+        </p:txBody>
+      </p:sp>
+      <p:sp>
+        <p:nvSpPr>
+          <p:cNvPr id="4" name="Slide Number Placeholder 3"/>
+          <p:cNvSpPr>
+            <a:spLocks noGrp="1"/>
+          </p:cNvSpPr>
+          <p:nvPr>
+            <p:ph type="sldNum" sz="quarter" idx="10"/>
+          </p:nvPr>
+        </p:nvSpPr>
+        <p:spPr/>
+        <p:txBody>
+          <a:bodyPr/>
+          <a:lstStyle/>
+          <a:p>
+            <a:fld id="{F375C37C-2F89-1044-AB8A-95317A63F08B}" type="slidenum">
+              <a:rPr lang="en-US" smtClean="0"/>
+              <a:t>4</a:t>
+            </a:fld>
+            <a:endParaRPr lang="en-US"/>
+          </a:p>
+        </p:txBody>
+      </p:sp>
+    </p:spTree>
+    <p:extLst>
+      <p:ext uri="{BB962C8B-B14F-4D97-AF65-F5344CB8AC3E}">
+        <p14:creationId xmlns:p14="http://schemas.microsoft.com/office/powerpoint/2010/main" val="805079171"/>
+      </p:ext>
+    </p:extLst>
+  </p:cSld>
+  <p:clrMapOvr>
+    <a:masterClrMapping/>
+  </p:clrMapOvr>
+</p:notes>
+</file>
+
+<file path=ppt/notesSlides/notesSlide3.xml><?xml version="1.0" encoding="utf-8"?>
+<p:notes xmlns:a="http://schemas.openxmlformats.org/drawingml/2006/main" xmlns:r="http://schemas.openxmlformats.org/officeDocument/2006/relationships" xmlns:p="http://schemas.openxmlformats.org/presentationml/2006/main">
+  <p:cSld>
+    <p:spTree>
+      <p:nvGrpSpPr>
+        <p:cNvPr id="1" name=""/>
+        <p:cNvGrpSpPr/>
+        <p:nvPr/>
+      </p:nvGrpSpPr>
+      <p:grpSpPr>
+        <a:xfrm>
+          <a:off x="0" y="0"/>
+          <a:ext cx="0" cy="0"/>
+          <a:chOff x="0" y="0"/>
+          <a:chExt cx="0" cy="0"/>
+        </a:xfrm>
+      </p:grpSpPr>
+      <p:sp>
+        <p:nvSpPr>
+          <p:cNvPr id="2" name="Slide Image Placeholder 1"/>
+          <p:cNvSpPr>
+            <a:spLocks noGrp="1" noRot="1" noChangeAspect="1"/>
+          </p:cNvSpPr>
+          <p:nvPr>
+            <p:ph type="sldImg"/>
+          </p:nvPr>
+        </p:nvSpPr>
+        <p:spPr/>
+      </p:sp>
+      <p:sp>
+        <p:nvSpPr>
+          <p:cNvPr id="3" name="Notes Placeholder 2"/>
+          <p:cNvSpPr>
+            <a:spLocks noGrp="1"/>
+          </p:cNvSpPr>
+          <p:nvPr>
+            <p:ph type="body" idx="1"/>
+          </p:nvPr>
+        </p:nvSpPr>
+        <p:spPr/>
+        <p:txBody>
+          <a:bodyPr/>
+          <a:lstStyle/>
+          <a:p>
+            <a:r>
+              <a:rPr lang="en-US" dirty="0" smtClean="0"/>
+              <a:t>Support server parts</a:t>
+            </a:r>
+          </a:p>
+          <a:p>
+            <a:r>
+              <a:rPr lang="en-US" dirty="0" smtClean="0"/>
+              <a:t>Support domain name</a:t>
+            </a:r>
+          </a:p>
+          <a:p>
+            <a:r>
+              <a:rPr lang="en-US" dirty="0" err="1" smtClean="0"/>
+              <a:t>Multpile</a:t>
+            </a:r>
+            <a:r>
+              <a:rPr lang="en-US" baseline="0" dirty="0" smtClean="0"/>
+              <a:t> </a:t>
+            </a:r>
+            <a:r>
+              <a:rPr lang="en-US" baseline="0" dirty="0" err="1" smtClean="0"/>
+              <a:t>ip</a:t>
+            </a:r>
+            <a:r>
+              <a:rPr lang="en-US" baseline="0" dirty="0" smtClean="0"/>
+              <a:t> with same domain</a:t>
+            </a:r>
+            <a:endParaRPr lang="en-US" dirty="0"/>
+          </a:p>
+        </p:txBody>
+      </p:sp>
+      <p:sp>
+        <p:nvSpPr>
+          <p:cNvPr id="4" name="Slide Number Placeholder 3"/>
+          <p:cNvSpPr>
+            <a:spLocks noGrp="1"/>
+          </p:cNvSpPr>
+          <p:nvPr>
+            <p:ph type="sldNum" sz="quarter" idx="10"/>
+          </p:nvPr>
+        </p:nvSpPr>
+        <p:spPr/>
+        <p:txBody>
+          <a:bodyPr/>
+          <a:lstStyle/>
+          <a:p>
+            <a:fld id="{F375C37C-2F89-1044-AB8A-95317A63F08B}" type="slidenum">
+              <a:rPr lang="en-US" smtClean="0"/>
+              <a:t>5</a:t>
+            </a:fld>
+            <a:endParaRPr lang="en-US"/>
+          </a:p>
+        </p:txBody>
+      </p:sp>
+    </p:spTree>
+    <p:extLst>
+      <p:ext uri="{BB962C8B-B14F-4D97-AF65-F5344CB8AC3E}">
+        <p14:creationId xmlns:p14="http://schemas.microsoft.com/office/powerpoint/2010/main" val="1318953947"/>
+      </p:ext>
+    </p:extLst>
+  </p:cSld>
+  <p:clrMapOvr>
+    <a:masterClrMapping/>
+  </p:clrMapOvr>
+</p:notes>
 </file>
 
 <file path=ppt/slideLayouts/slideLayout1.xml><?xml version="1.0" encoding="utf-8"?>
@@ -840,7 +1505,7 @@
           <a:p>
             <a:fld id="{4B50119B-A323-4E91-94F4-3C14B7DF8B30}" type="datetimeFigureOut">
               <a:rPr lang="en-US" smtClean="0"/>
-              <a:t>5/30/2017</a:t>
+              <a:t>5/30/17</a:t>
             </a:fld>
             <a:endParaRPr lang="en-US"/>
           </a:p>
@@ -1091,7 +1756,7 @@
           <a:p>
             <a:fld id="{4B50119B-A323-4E91-94F4-3C14B7DF8B30}" type="datetimeFigureOut">
               <a:rPr lang="en-US" smtClean="0"/>
-              <a:t>5/30/2017</a:t>
+              <a:t>5/30/17</a:t>
             </a:fld>
             <a:endParaRPr lang="en-US"/>
           </a:p>
@@ -1405,7 +2070,7 @@
           <a:p>
             <a:fld id="{4B50119B-A323-4E91-94F4-3C14B7DF8B30}" type="datetimeFigureOut">
               <a:rPr lang="en-US" smtClean="0"/>
-              <a:t>5/30/2017</a:t>
+              <a:t>5/30/17</a:t>
             </a:fld>
             <a:endParaRPr lang="en-US"/>
           </a:p>
@@ -1732,7 +2397,7 @@
           <a:p>
             <a:fld id="{4B50119B-A323-4E91-94F4-3C14B7DF8B30}" type="datetimeFigureOut">
               <a:rPr lang="en-US" smtClean="0"/>
-              <a:t>5/30/2017</a:t>
+              <a:t>5/30/17</a:t>
             </a:fld>
             <a:endParaRPr lang="en-US"/>
           </a:p>
@@ -2046,7 +2711,7 @@
           <a:p>
             <a:fld id="{4B50119B-A323-4E91-94F4-3C14B7DF8B30}" type="datetimeFigureOut">
               <a:rPr lang="en-US" smtClean="0"/>
-              <a:t>5/30/2017</a:t>
+              <a:t>5/30/17</a:t>
             </a:fld>
             <a:endParaRPr lang="en-US"/>
           </a:p>
@@ -2433,7 +3098,7 @@
           <a:p>
             <a:fld id="{4B50119B-A323-4E91-94F4-3C14B7DF8B30}" type="datetimeFigureOut">
               <a:rPr lang="en-US" smtClean="0"/>
-              <a:t>5/30/2017</a:t>
+              <a:t>5/30/17</a:t>
             </a:fld>
             <a:endParaRPr lang="en-US"/>
           </a:p>
@@ -2603,7 +3268,7 @@
           <a:p>
             <a:fld id="{4B50119B-A323-4E91-94F4-3C14B7DF8B30}" type="datetimeFigureOut">
               <a:rPr lang="en-US" smtClean="0"/>
-              <a:t>5/30/2017</a:t>
+              <a:t>5/30/17</a:t>
             </a:fld>
             <a:endParaRPr lang="en-US"/>
           </a:p>
@@ -2783,7 +3448,7 @@
           <a:p>
             <a:fld id="{4B50119B-A323-4E91-94F4-3C14B7DF8B30}" type="datetimeFigureOut">
               <a:rPr lang="en-US" smtClean="0"/>
-              <a:t>5/30/2017</a:t>
+              <a:t>5/30/17</a:t>
             </a:fld>
             <a:endParaRPr lang="en-US"/>
           </a:p>
@@ -2959,7 +3624,7 @@
           <a:p>
             <a:fld id="{4B50119B-A323-4E91-94F4-3C14B7DF8B30}" type="datetimeFigureOut">
               <a:rPr lang="en-US" smtClean="0"/>
-              <a:t>5/30/2017</a:t>
+              <a:t>5/30/17</a:t>
             </a:fld>
             <a:endParaRPr lang="en-US"/>
           </a:p>
@@ -3206,7 +3871,7 @@
           <a:p>
             <a:fld id="{4B50119B-A323-4E91-94F4-3C14B7DF8B30}" type="datetimeFigureOut">
               <a:rPr lang="en-US" smtClean="0"/>
-              <a:t>5/30/2017</a:t>
+              <a:t>5/30/17</a:t>
             </a:fld>
             <a:endParaRPr lang="en-US"/>
           </a:p>
@@ -3438,7 +4103,7 @@
           <a:p>
             <a:fld id="{4B50119B-A323-4E91-94F4-3C14B7DF8B30}" type="datetimeFigureOut">
               <a:rPr lang="en-US" smtClean="0"/>
-              <a:t>5/30/2017</a:t>
+              <a:t>5/30/17</a:t>
             </a:fld>
             <a:endParaRPr lang="en-US"/>
           </a:p>
@@ -3812,7 +4477,7 @@
           <a:p>
             <a:fld id="{4B50119B-A323-4E91-94F4-3C14B7DF8B30}" type="datetimeFigureOut">
               <a:rPr lang="en-US" smtClean="0"/>
-              <a:t>5/30/2017</a:t>
+              <a:t>5/30/17</a:t>
             </a:fld>
             <a:endParaRPr lang="en-US"/>
           </a:p>
@@ -3935,7 +4600,7 @@
           <a:p>
             <a:fld id="{4B50119B-A323-4E91-94F4-3C14B7DF8B30}" type="datetimeFigureOut">
               <a:rPr lang="en-US" smtClean="0"/>
-              <a:t>5/30/2017</a:t>
+              <a:t>5/30/17</a:t>
             </a:fld>
             <a:endParaRPr lang="en-US"/>
           </a:p>
@@ -4030,7 +4695,7 @@
           <a:p>
             <a:fld id="{4B50119B-A323-4E91-94F4-3C14B7DF8B30}" type="datetimeFigureOut">
               <a:rPr lang="en-US" smtClean="0"/>
-              <a:t>5/30/2017</a:t>
+              <a:t>5/30/17</a:t>
             </a:fld>
             <a:endParaRPr lang="en-US"/>
           </a:p>
@@ -4285,7 +4950,7 @@
           <a:p>
             <a:fld id="{4B50119B-A323-4E91-94F4-3C14B7DF8B30}" type="datetimeFigureOut">
               <a:rPr lang="en-US" smtClean="0"/>
-              <a:t>5/30/2017</a:t>
+              <a:t>5/30/17</a:t>
             </a:fld>
             <a:endParaRPr lang="en-US"/>
           </a:p>
@@ -4548,7 +5213,7 @@
           <a:p>
             <a:fld id="{4B50119B-A323-4E91-94F4-3C14B7DF8B30}" type="datetimeFigureOut">
               <a:rPr lang="en-US" smtClean="0"/>
-              <a:t>5/30/2017</a:t>
+              <a:t>5/30/17</a:t>
             </a:fld>
             <a:endParaRPr lang="en-US"/>
           </a:p>
@@ -5293,7 +5958,7 @@
           <a:p>
             <a:fld id="{4B50119B-A323-4E91-94F4-3C14B7DF8B30}" type="datetimeFigureOut">
               <a:rPr lang="en-US" smtClean="0"/>
-              <a:t>5/30/2017</a:t>
+              <a:t>5/30/17</a:t>
             </a:fld>
             <a:endParaRPr lang="en-US"/>
           </a:p>
@@ -5897,6 +6562,13 @@
   <p:clrMapOvr>
     <a:masterClrMapping/>
   </p:clrMapOvr>
+  <p:timing>
+    <p:tnLst>
+      <p:par>
+        <p:cTn id="1" dur="indefinite" restart="never" nodeType="tmRoot"/>
+      </p:par>
+    </p:tnLst>
+  </p:timing>
 </p:sld>
 </file>
 
@@ -5964,8 +6636,17 @@
             </a:r>
             <a:r>
               <a:rPr lang="en-US" dirty="0"/>
-              <a:t> prevent mal-homework from poaching testcase?</a:t>
-            </a:r>
+              <a:t> prevent mal-homework from </a:t>
+            </a:r>
+            <a:r>
+              <a:rPr lang="en-US" dirty="0" smtClean="0"/>
+              <a:t>doing dangerous things</a:t>
+            </a:r>
+            <a:r>
+              <a:rPr lang="en-US" dirty="0" smtClean="0"/>
+              <a:t>?</a:t>
+            </a:r>
+            <a:endParaRPr lang="en-US" dirty="0"/>
           </a:p>
         </p:txBody>
       </p:sp>
@@ -5979,6 +6660,13 @@
   <p:clrMapOvr>
     <a:masterClrMapping/>
   </p:clrMapOvr>
+  <p:timing>
+    <p:tnLst>
+      <p:par>
+        <p:cTn id="1" dur="indefinite" restart="never" nodeType="tmRoot"/>
+      </p:par>
+    </p:tnLst>
+  </p:timing>
 </p:sld>
 </file>
 
@@ -6069,6 +6757,13 @@
   <p:clrMapOvr>
     <a:masterClrMapping/>
   </p:clrMapOvr>
+  <p:timing>
+    <p:tnLst>
+      <p:par>
+        <p:cTn id="1" dur="indefinite" restart="never" nodeType="tmRoot"/>
+      </p:par>
+    </p:tnLst>
+  </p:timing>
 </p:sld>
 </file>
 
@@ -6143,6 +6838,13 @@
   <p:clrMapOvr>
     <a:masterClrMapping/>
   </p:clrMapOvr>
+  <p:timing>
+    <p:tnLst>
+      <p:par>
+        <p:cTn id="1" dur="indefinite" restart="never" nodeType="tmRoot"/>
+      </p:par>
+    </p:tnLst>
+  </p:timing>
 </p:sld>
 </file>
 
@@ -6214,6 +6916,13 @@
   <p:clrMapOvr>
     <a:masterClrMapping/>
   </p:clrMapOvr>
+  <p:timing>
+    <p:tnLst>
+      <p:par>
+        <p:cTn id="1" dur="indefinite" restart="never" nodeType="tmRoot"/>
+      </p:par>
+    </p:tnLst>
+  </p:timing>
 </p:sld>
 </file>
 
@@ -6317,6 +7026,13 @@
   <p:clrMapOvr>
     <a:masterClrMapping/>
   </p:clrMapOvr>
+  <p:timing>
+    <p:tnLst>
+      <p:par>
+        <p:cTn id="1" dur="indefinite" restart="never" nodeType="tmRoot"/>
+      </p:par>
+    </p:tnLst>
+  </p:timing>
 </p:sld>
 </file>
 
@@ -6575,4 +7291,265 @@
     </a:ext>
   </a:extLst>
 </a:theme>
+</file>
+
+<file path=ppt/theme/theme2.xml><?xml version="1.0" encoding="utf-8"?>
+<a:theme xmlns:a="http://schemas.openxmlformats.org/drawingml/2006/main" name="Office Theme">
+  <a:themeElements>
+    <a:clrScheme name="Office">
+      <a:dk1>
+        <a:sysClr val="windowText" lastClr="000000"/>
+      </a:dk1>
+      <a:lt1>
+        <a:sysClr val="window" lastClr="FFFFFF"/>
+      </a:lt1>
+      <a:dk2>
+        <a:srgbClr val="44546A"/>
+      </a:dk2>
+      <a:lt2>
+        <a:srgbClr val="E7E6E6"/>
+      </a:lt2>
+      <a:accent1>
+        <a:srgbClr val="4472C4"/>
+      </a:accent1>
+      <a:accent2>
+        <a:srgbClr val="ED7D31"/>
+      </a:accent2>
+      <a:accent3>
+        <a:srgbClr val="A5A5A5"/>
+      </a:accent3>
+      <a:accent4>
+        <a:srgbClr val="FFC000"/>
+      </a:accent4>
+      <a:accent5>
+        <a:srgbClr val="5B9BD5"/>
+      </a:accent5>
+      <a:accent6>
+        <a:srgbClr val="70AD47"/>
+      </a:accent6>
+      <a:hlink>
+        <a:srgbClr val="0563C1"/>
+      </a:hlink>
+      <a:folHlink>
+        <a:srgbClr val="954F72"/>
+      </a:folHlink>
+    </a:clrScheme>
+    <a:fontScheme name="Office">
+      <a:majorFont>
+        <a:latin typeface="Calibri Light" panose="020F0302020204030204"/>
+        <a:ea typeface=""/>
+        <a:cs typeface=""/>
+        <a:font script="Jpan" typeface="Yu Gothic Light"/>
+        <a:font script="Hang" typeface="맑은 고딕"/>
+        <a:font script="Hans" typeface="DengXian Light"/>
+        <a:font script="Hant" typeface="新細明體"/>
+        <a:font script="Arab" typeface="Times New Roman"/>
+        <a:font script="Hebr" typeface="Times New Roman"/>
+        <a:font script="Thai" typeface="Angsana New"/>
+        <a:font script="Ethi" typeface="Nyala"/>
+        <a:font script="Beng" typeface="Vrinda"/>
+        <a:font script="Gujr" typeface="Shruti"/>
+        <a:font script="Khmr" typeface="MoolBoran"/>
+        <a:font script="Knda" typeface="Tunga"/>
+        <a:font script="Guru" typeface="Raavi"/>
+        <a:font script="Cans" typeface="Euphemia"/>
+        <a:font script="Cher" typeface="Plantagenet Cherokee"/>
+        <a:font script="Yiii" typeface="Microsoft Yi Baiti"/>
+        <a:font script="Tibt" typeface="Microsoft Himalaya"/>
+        <a:font script="Thaa" typeface="MV Boli"/>
+        <a:font script="Deva" typeface="Mangal"/>
+        <a:font script="Telu" typeface="Gautami"/>
+        <a:font script="Taml" typeface="Latha"/>
+        <a:font script="Syrc" typeface="Estrangelo Edessa"/>
+        <a:font script="Orya" typeface="Kalinga"/>
+        <a:font script="Mlym" typeface="Kartika"/>
+        <a:font script="Laoo" typeface="DokChampa"/>
+        <a:font script="Sinh" typeface="Iskoola Pota"/>
+        <a:font script="Mong" typeface="Mongolian Baiti"/>
+        <a:font script="Viet" typeface="Times New Roman"/>
+        <a:font script="Uigh" typeface="Microsoft Uighur"/>
+        <a:font script="Geor" typeface="Sylfaen"/>
+      </a:majorFont>
+      <a:minorFont>
+        <a:latin typeface="Calibri" panose="020F0502020204030204"/>
+        <a:ea typeface=""/>
+        <a:cs typeface=""/>
+        <a:font script="Jpan" typeface="Yu Gothic"/>
+        <a:font script="Hang" typeface="맑은 고딕"/>
+        <a:font script="Hans" typeface="DengXian"/>
+        <a:font script="Hant" typeface="新細明體"/>
+        <a:font script="Arab" typeface="Arial"/>
+        <a:font script="Hebr" typeface="Arial"/>
+        <a:font script="Thai" typeface="Cordia New"/>
+        <a:font script="Ethi" typeface="Nyala"/>
+        <a:font script="Beng" typeface="Vrinda"/>
+        <a:font script="Gujr" typeface="Shruti"/>
+        <a:font script="Khmr" typeface="DaunPenh"/>
+        <a:font script="Knda" typeface="Tunga"/>
+        <a:font script="Guru" typeface="Raavi"/>
+        <a:font script="Cans" typeface="Euphemia"/>
+        <a:font script="Cher" typeface="Plantagenet Cherokee"/>
+        <a:font script="Yiii" typeface="Microsoft Yi Baiti"/>
+        <a:font script="Tibt" typeface="Microsoft Himalaya"/>
+        <a:font script="Thaa" typeface="MV Boli"/>
+        <a:font script="Deva" typeface="Mangal"/>
+        <a:font script="Telu" typeface="Gautami"/>
+        <a:font script="Taml" typeface="Latha"/>
+        <a:font script="Syrc" typeface="Estrangelo Edessa"/>
+        <a:font script="Orya" typeface="Kalinga"/>
+        <a:font script="Mlym" typeface="Kartika"/>
+        <a:font script="Laoo" typeface="DokChampa"/>
+        <a:font script="Sinh" typeface="Iskoola Pota"/>
+        <a:font script="Mong" typeface="Mongolian Baiti"/>
+        <a:font script="Viet" typeface="Arial"/>
+        <a:font script="Uigh" typeface="Microsoft Uighur"/>
+        <a:font script="Geor" typeface="Sylfaen"/>
+      </a:minorFont>
+    </a:fontScheme>
+    <a:fmtScheme name="Office">
+      <a:fillStyleLst>
+        <a:solidFill>
+          <a:schemeClr val="phClr"/>
+        </a:solidFill>
+        <a:gradFill rotWithShape="1">
+          <a:gsLst>
+            <a:gs pos="0">
+              <a:schemeClr val="phClr">
+                <a:lumMod val="110000"/>
+                <a:satMod val="105000"/>
+                <a:tint val="67000"/>
+              </a:schemeClr>
+            </a:gs>
+            <a:gs pos="50000">
+              <a:schemeClr val="phClr">
+                <a:lumMod val="105000"/>
+                <a:satMod val="103000"/>
+                <a:tint val="73000"/>
+              </a:schemeClr>
+            </a:gs>
+            <a:gs pos="100000">
+              <a:schemeClr val="phClr">
+                <a:lumMod val="105000"/>
+                <a:satMod val="109000"/>
+                <a:tint val="81000"/>
+              </a:schemeClr>
+            </a:gs>
+          </a:gsLst>
+          <a:lin ang="5400000" scaled="0"/>
+        </a:gradFill>
+        <a:gradFill rotWithShape="1">
+          <a:gsLst>
+            <a:gs pos="0">
+              <a:schemeClr val="phClr">
+                <a:satMod val="103000"/>
+                <a:lumMod val="102000"/>
+                <a:tint val="94000"/>
+              </a:schemeClr>
+            </a:gs>
+            <a:gs pos="50000">
+              <a:schemeClr val="phClr">
+                <a:satMod val="110000"/>
+                <a:lumMod val="100000"/>
+                <a:shade val="100000"/>
+              </a:schemeClr>
+            </a:gs>
+            <a:gs pos="100000">
+              <a:schemeClr val="phClr">
+                <a:lumMod val="99000"/>
+                <a:satMod val="120000"/>
+                <a:shade val="78000"/>
+              </a:schemeClr>
+            </a:gs>
+          </a:gsLst>
+          <a:lin ang="5400000" scaled="0"/>
+        </a:gradFill>
+      </a:fillStyleLst>
+      <a:lnStyleLst>
+        <a:ln w="6350" cap="flat" cmpd="sng" algn="ctr">
+          <a:solidFill>
+            <a:schemeClr val="phClr"/>
+          </a:solidFill>
+          <a:prstDash val="solid"/>
+          <a:miter lim="800000"/>
+        </a:ln>
+        <a:ln w="12700" cap="flat" cmpd="sng" algn="ctr">
+          <a:solidFill>
+            <a:schemeClr val="phClr"/>
+          </a:solidFill>
+          <a:prstDash val="solid"/>
+          <a:miter lim="800000"/>
+        </a:ln>
+        <a:ln w="19050" cap="flat" cmpd="sng" algn="ctr">
+          <a:solidFill>
+            <a:schemeClr val="phClr"/>
+          </a:solidFill>
+          <a:prstDash val="solid"/>
+          <a:miter lim="800000"/>
+        </a:ln>
+      </a:lnStyleLst>
+      <a:effectStyleLst>
+        <a:effectStyle>
+          <a:effectLst/>
+        </a:effectStyle>
+        <a:effectStyle>
+          <a:effectLst/>
+        </a:effectStyle>
+        <a:effectStyle>
+          <a:effectLst>
+            <a:outerShdw blurRad="57150" dist="19050" dir="5400000" algn="ctr" rotWithShape="0">
+              <a:srgbClr val="000000">
+                <a:alpha val="63000"/>
+              </a:srgbClr>
+            </a:outerShdw>
+          </a:effectLst>
+        </a:effectStyle>
+      </a:effectStyleLst>
+      <a:bgFillStyleLst>
+        <a:solidFill>
+          <a:schemeClr val="phClr"/>
+        </a:solidFill>
+        <a:solidFill>
+          <a:schemeClr val="phClr">
+            <a:tint val="95000"/>
+            <a:satMod val="170000"/>
+          </a:schemeClr>
+        </a:solidFill>
+        <a:gradFill rotWithShape="1">
+          <a:gsLst>
+            <a:gs pos="0">
+              <a:schemeClr val="phClr">
+                <a:tint val="93000"/>
+                <a:satMod val="150000"/>
+                <a:shade val="98000"/>
+                <a:lumMod val="102000"/>
+              </a:schemeClr>
+            </a:gs>
+            <a:gs pos="50000">
+              <a:schemeClr val="phClr">
+                <a:tint val="98000"/>
+                <a:satMod val="130000"/>
+                <a:shade val="90000"/>
+                <a:lumMod val="103000"/>
+              </a:schemeClr>
+            </a:gs>
+            <a:gs pos="100000">
+              <a:schemeClr val="phClr">
+                <a:shade val="63000"/>
+                <a:satMod val="120000"/>
+              </a:schemeClr>
+            </a:gs>
+          </a:gsLst>
+          <a:lin ang="5400000" scaled="0"/>
+        </a:gradFill>
+      </a:bgFillStyleLst>
+    </a:fmtScheme>
+  </a:themeElements>
+  <a:objectDefaults/>
+  <a:extraClrSchemeLst/>
+  <a:extLst>
+    <a:ext uri="{05A4C25C-085E-4340-85A3-A5531E510DB2}">
+      <thm15:themeFamily xmlns:thm15="http://schemas.microsoft.com/office/thememl/2012/main" name="Office Theme" id="{62F939B6-93AF-4DB8-9C6B-D6C7DFDC589F}" vid="{4A3C46E8-61CC-4603-A589-7422A47A8E4A}"/>
+    </a:ext>
+  </a:extLst>
+</a:theme>
 </file>
</xml_diff>